<commit_message>
updating with final results
</commit_message>
<xml_diff>
--- a/FinalPresentation.pptx
+++ b/FinalPresentation.pptx
@@ -5,7 +5,7 @@
     <p:sldMasterId id="2147483648" r:id="rId1"/>
   </p:sldMasterIdLst>
   <p:notesMasterIdLst>
-    <p:notesMasterId r:id="rId12"/>
+    <p:notesMasterId r:id="rId13"/>
   </p:notesMasterIdLst>
   <p:sldIdLst>
     <p:sldId id="256" r:id="rId2"/>
@@ -13,11 +13,12 @@
     <p:sldId id="258" r:id="rId4"/>
     <p:sldId id="259" r:id="rId5"/>
     <p:sldId id="260" r:id="rId6"/>
-    <p:sldId id="261" r:id="rId7"/>
-    <p:sldId id="262" r:id="rId8"/>
-    <p:sldId id="263" r:id="rId9"/>
-    <p:sldId id="264" r:id="rId10"/>
-    <p:sldId id="265" r:id="rId11"/>
+    <p:sldId id="266" r:id="rId7"/>
+    <p:sldId id="261" r:id="rId8"/>
+    <p:sldId id="262" r:id="rId9"/>
+    <p:sldId id="263" r:id="rId10"/>
+    <p:sldId id="264" r:id="rId11"/>
+    <p:sldId id="265" r:id="rId12"/>
   </p:sldIdLst>
   <p:sldSz cx="9144000" cy="6858000" type="screen4x3"/>
   <p:notesSz cx="6858000" cy="9144000"/>
@@ -201,7 +202,7 @@
           <a:p>
             <a:fld id="{64C7C002-39D9-AF4C-83C5-968C30E83B0F}" type="datetimeFigureOut">
               <a:rPr lang="en-US" smtClean="0"/>
-              <a:t>1/23/18</a:t>
+              <a:t>1/27/18</a:t>
             </a:fld>
             <a:endParaRPr lang="en-US"/>
           </a:p>
@@ -534,7 +535,7 @@
           <a:p>
             <a:fld id="{7813E41D-F2A7-3B45-A9BB-FEA0489AB4A1}" type="slidenum">
               <a:rPr lang="en-US" smtClean="0"/>
-              <a:t>10</a:t>
+              <a:t>11</a:t>
             </a:fld>
             <a:endParaRPr lang="en-US"/>
           </a:p>
@@ -734,7 +735,7 @@
           <a:p>
             <a:fld id="{D75ABECA-8825-F549-B3C8-0A2B690E7D5E}" type="datetimeFigureOut">
               <a:rPr lang="en-US" smtClean="0"/>
-              <a:t>1/23/18</a:t>
+              <a:t>1/27/18</a:t>
             </a:fld>
             <a:endParaRPr lang="en-US"/>
           </a:p>
@@ -904,7 +905,7 @@
           <a:p>
             <a:fld id="{D75ABECA-8825-F549-B3C8-0A2B690E7D5E}" type="datetimeFigureOut">
               <a:rPr lang="en-US" smtClean="0"/>
-              <a:t>1/23/18</a:t>
+              <a:t>1/27/18</a:t>
             </a:fld>
             <a:endParaRPr lang="en-US"/>
           </a:p>
@@ -1084,7 +1085,7 @@
           <a:p>
             <a:fld id="{D75ABECA-8825-F549-B3C8-0A2B690E7D5E}" type="datetimeFigureOut">
               <a:rPr lang="en-US" smtClean="0"/>
-              <a:t>1/23/18</a:t>
+              <a:t>1/27/18</a:t>
             </a:fld>
             <a:endParaRPr lang="en-US"/>
           </a:p>
@@ -1254,7 +1255,7 @@
           <a:p>
             <a:fld id="{D75ABECA-8825-F549-B3C8-0A2B690E7D5E}" type="datetimeFigureOut">
               <a:rPr lang="en-US" smtClean="0"/>
-              <a:t>1/23/18</a:t>
+              <a:t>1/27/18</a:t>
             </a:fld>
             <a:endParaRPr lang="en-US"/>
           </a:p>
@@ -1500,7 +1501,7 @@
           <a:p>
             <a:fld id="{D75ABECA-8825-F549-B3C8-0A2B690E7D5E}" type="datetimeFigureOut">
               <a:rPr lang="en-US" smtClean="0"/>
-              <a:t>1/23/18</a:t>
+              <a:t>1/27/18</a:t>
             </a:fld>
             <a:endParaRPr lang="en-US"/>
           </a:p>
@@ -1788,7 +1789,7 @@
           <a:p>
             <a:fld id="{D75ABECA-8825-F549-B3C8-0A2B690E7D5E}" type="datetimeFigureOut">
               <a:rPr lang="en-US" smtClean="0"/>
-              <a:t>1/23/18</a:t>
+              <a:t>1/27/18</a:t>
             </a:fld>
             <a:endParaRPr lang="en-US"/>
           </a:p>
@@ -2210,7 +2211,7 @@
           <a:p>
             <a:fld id="{D75ABECA-8825-F549-B3C8-0A2B690E7D5E}" type="datetimeFigureOut">
               <a:rPr lang="en-US" smtClean="0"/>
-              <a:t>1/23/18</a:t>
+              <a:t>1/27/18</a:t>
             </a:fld>
             <a:endParaRPr lang="en-US"/>
           </a:p>
@@ -2328,7 +2329,7 @@
           <a:p>
             <a:fld id="{D75ABECA-8825-F549-B3C8-0A2B690E7D5E}" type="datetimeFigureOut">
               <a:rPr lang="en-US" smtClean="0"/>
-              <a:t>1/23/18</a:t>
+              <a:t>1/27/18</a:t>
             </a:fld>
             <a:endParaRPr lang="en-US"/>
           </a:p>
@@ -2423,7 +2424,7 @@
           <a:p>
             <a:fld id="{D75ABECA-8825-F549-B3C8-0A2B690E7D5E}" type="datetimeFigureOut">
               <a:rPr lang="en-US" smtClean="0"/>
-              <a:t>1/23/18</a:t>
+              <a:t>1/27/18</a:t>
             </a:fld>
             <a:endParaRPr lang="en-US"/>
           </a:p>
@@ -2700,7 +2701,7 @@
           <a:p>
             <a:fld id="{D75ABECA-8825-F549-B3C8-0A2B690E7D5E}" type="datetimeFigureOut">
               <a:rPr lang="en-US" smtClean="0"/>
-              <a:t>1/23/18</a:t>
+              <a:t>1/27/18</a:t>
             </a:fld>
             <a:endParaRPr lang="en-US"/>
           </a:p>
@@ -2953,7 +2954,7 @@
           <a:p>
             <a:fld id="{D75ABECA-8825-F549-B3C8-0A2B690E7D5E}" type="datetimeFigureOut">
               <a:rPr lang="en-US" smtClean="0"/>
-              <a:t>1/23/18</a:t>
+              <a:t>1/27/18</a:t>
             </a:fld>
             <a:endParaRPr lang="en-US"/>
           </a:p>
@@ -3166,7 +3167,7 @@
           <a:p>
             <a:fld id="{D75ABECA-8825-F549-B3C8-0A2B690E7D5E}" type="datetimeFigureOut">
               <a:rPr lang="en-US" smtClean="0"/>
-              <a:t>1/23/18</a:t>
+              <a:t>1/27/18</a:t>
             </a:fld>
             <a:endParaRPr lang="en-US"/>
           </a:p>
@@ -3634,6 +3635,82 @@
       </p:grpSpPr>
       <p:sp>
         <p:nvSpPr>
+          <p:cNvPr id="3" name="Content Placeholder 2"/>
+          <p:cNvSpPr>
+            <a:spLocks noGrp="1"/>
+          </p:cNvSpPr>
+          <p:nvPr>
+            <p:ph idx="1"/>
+          </p:nvPr>
+        </p:nvSpPr>
+        <p:spPr/>
+        <p:txBody>
+          <a:bodyPr/>
+          <a:lstStyle/>
+          <a:p>
+            <a:r>
+              <a:rPr lang="en-US" dirty="0" smtClean="0"/>
+              <a:t>By considering recall </a:t>
+            </a:r>
+            <a:r>
+              <a:rPr lang="en-US" dirty="0" smtClean="0"/>
+              <a:t>score and confusion matrix, decision tree </a:t>
+            </a:r>
+            <a:r>
+              <a:rPr lang="en-US" dirty="0" smtClean="0"/>
+              <a:t>seems </a:t>
+            </a:r>
+            <a:r>
+              <a:rPr lang="en-US" dirty="0" smtClean="0"/>
+              <a:t>to be better suited to predict if the clients will subscribe to term </a:t>
+            </a:r>
+            <a:r>
+              <a:rPr lang="en-US" dirty="0" smtClean="0"/>
+              <a:t>deposit.</a:t>
+            </a:r>
+            <a:endParaRPr lang="en-US" dirty="0"/>
+          </a:p>
+        </p:txBody>
+      </p:sp>
+    </p:spTree>
+    <p:extLst>
+      <p:ext uri="{BB962C8B-B14F-4D97-AF65-F5344CB8AC3E}">
+        <p14:creationId xmlns:p14="http://schemas.microsoft.com/office/powerpoint/2010/main" val="3629960206"/>
+      </p:ext>
+    </p:extLst>
+  </p:cSld>
+  <p:clrMapOvr>
+    <a:masterClrMapping/>
+  </p:clrMapOvr>
+  <p:timing>
+    <p:tnLst>
+      <p:par>
+        <p:cTn xmlns:p14="http://schemas.microsoft.com/office/powerpoint/2010/main" id="1" dur="indefinite" restart="never" nodeType="tmRoot"/>
+      </p:par>
+    </p:tnLst>
+  </p:timing>
+</p:sld>
+</file>
+
+<file path=ppt/slides/slide11.xml><?xml version="1.0" encoding="utf-8"?>
+<p:sld xmlns:a="http://schemas.openxmlformats.org/drawingml/2006/main" xmlns:r="http://schemas.openxmlformats.org/officeDocument/2006/relationships" xmlns:p="http://schemas.openxmlformats.org/presentationml/2006/main">
+  <p:cSld>
+    <p:spTree>
+      <p:nvGrpSpPr>
+        <p:cNvPr id="1" name=""/>
+        <p:cNvGrpSpPr/>
+        <p:nvPr/>
+      </p:nvGrpSpPr>
+      <p:grpSpPr>
+        <a:xfrm>
+          <a:off x="0" y="0"/>
+          <a:ext cx="0" cy="0"/>
+          <a:chOff x="0" y="0"/>
+          <a:chExt cx="0" cy="0"/>
+        </a:xfrm>
+      </p:grpSpPr>
+      <p:sp>
+        <p:nvSpPr>
           <p:cNvPr id="2" name="Title 1"/>
           <p:cNvSpPr>
             <a:spLocks noGrp="1"/>
@@ -3647,6 +3724,10 @@
           <a:bodyPr/>
           <a:lstStyle/>
           <a:p>
+            <a:r>
+              <a:rPr lang="en-US" dirty="0" smtClean="0"/>
+              <a:t>Thank you</a:t>
+            </a:r>
             <a:endParaRPr lang="en-US" dirty="0"/>
           </a:p>
         </p:txBody>
@@ -3673,6 +3754,10 @@
             <a:r>
               <a:rPr lang="en-US" dirty="0" err="1" smtClean="0"/>
               <a:t>Raghotham</a:t>
+            </a:r>
+            <a:r>
+              <a:rPr lang="en-US" dirty="0" smtClean="0"/>
+              <a:t> for support and guidance</a:t>
             </a:r>
             <a:endParaRPr lang="en-US" dirty="0"/>
           </a:p>
@@ -3779,8 +3864,13 @@
           <a:p>
             <a:r>
               <a:rPr lang="en-US" dirty="0" smtClean="0"/>
-              <a:t>To use Classification Algorithms to predict if a client will subscribed to term deposit or not.</a:t>
-            </a:r>
+              <a:t>To use Classification Algorithms to predict if a client will subscribed to term </a:t>
+            </a:r>
+            <a:r>
+              <a:rPr lang="en-US" dirty="0" smtClean="0"/>
+              <a:t>deposit.</a:t>
+            </a:r>
+            <a:endParaRPr lang="en-US" dirty="0" smtClean="0"/>
           </a:p>
           <a:p>
             <a:r>
@@ -3791,15 +3881,23 @@
           <a:p>
             <a:r>
               <a:rPr lang="en-US" dirty="0" smtClean="0"/>
-              <a:t>Applying different machine learning algorithms to </a:t>
-            </a:r>
-            <a:r>
-              <a:rPr lang="en-US" dirty="0" err="1" smtClean="0"/>
-              <a:t>obatin</a:t>
-            </a:r>
-            <a:r>
-              <a:rPr lang="en-US" dirty="0" smtClean="0"/>
-              <a:t> best suitable model</a:t>
+              <a:t>Applying different machine learning </a:t>
+            </a:r>
+            <a:r>
+              <a:rPr lang="en-US" dirty="0" smtClean="0"/>
+              <a:t>algorithms to obtain </a:t>
+            </a:r>
+            <a:r>
+              <a:rPr lang="en-US" dirty="0" smtClean="0"/>
+              <a:t>best suitable </a:t>
+            </a:r>
+            <a:r>
+              <a:rPr lang="en-US" dirty="0" smtClean="0"/>
+              <a:t>model for our </a:t>
+            </a:r>
+            <a:r>
+              <a:rPr lang="en-US" smtClean="0"/>
+              <a:t>predictive analysis.</a:t>
             </a:r>
             <a:endParaRPr lang="en-US" dirty="0"/>
           </a:p>
@@ -3931,16 +4029,16 @@
               <a:t>csv</a:t>
             </a:r>
             <a:r>
-              <a:rPr lang="en-US" dirty="0" smtClean="0"/>
-              <a:t>, we upload the </a:t>
-            </a:r>
-            <a:r>
-              <a:rPr lang="en-US" dirty="0" err="1" smtClean="0"/>
-              <a:t>csv</a:t>
-            </a:r>
-            <a:r>
-              <a:rPr lang="en-US" dirty="0" smtClean="0"/>
-              <a:t> and get the </a:t>
+              <a:rPr lang="en-US" dirty="0"/>
+              <a:t> </a:t>
+            </a:r>
+            <a:r>
+              <a:rPr lang="en-US" dirty="0" smtClean="0"/>
+              <a:t>reader</a:t>
+            </a:r>
+            <a:r>
+              <a:rPr lang="en-US" dirty="0" smtClean="0"/>
+              <a:t> we obtain the </a:t>
             </a:r>
             <a:r>
               <a:rPr lang="en-US" dirty="0" err="1" smtClean="0"/>
@@ -4028,7 +4126,7 @@
         <p:spPr/>
         <p:txBody>
           <a:bodyPr>
-            <a:normAutofit fontScale="92500" lnSpcReduction="10000"/>
+            <a:normAutofit lnSpcReduction="10000"/>
           </a:bodyPr>
           <a:lstStyle/>
           <a:p>
@@ -4037,13 +4135,32 @@
             </a:pPr>
             <a:r>
               <a:rPr lang="en-US" dirty="0" smtClean="0"/>
-              <a:t>Portuguese banking institution is the client, it will help them </a:t>
-            </a:r>
-            <a:r>
-              <a:rPr lang="en-US" smtClean="0"/>
-              <a:t>to analyze</a:t>
-            </a:r>
-            <a:endParaRPr lang="en-US" dirty="0" smtClean="0"/>
+              <a:t>Portuguese banking institution is </a:t>
+            </a:r>
+            <a:r>
+              <a:rPr lang="en-US" dirty="0" smtClean="0"/>
+              <a:t>the major</a:t>
+            </a:r>
+            <a:r>
+              <a:rPr lang="en-US" dirty="0" smtClean="0"/>
+              <a:t> </a:t>
+            </a:r>
+            <a:r>
+              <a:rPr lang="en-US" dirty="0" smtClean="0"/>
+              <a:t>client, </a:t>
+            </a:r>
+            <a:r>
+              <a:rPr lang="en-US" dirty="0" smtClean="0"/>
+              <a:t>our analysis help </a:t>
+            </a:r>
+            <a:r>
+              <a:rPr lang="en-US" dirty="0" smtClean="0"/>
+              <a:t>them to </a:t>
+            </a:r>
+            <a:r>
+              <a:rPr lang="en-US" dirty="0" smtClean="0"/>
+              <a:t>find</a:t>
+            </a:r>
           </a:p>
           <a:p>
             <a:pPr marL="0" indent="0">
@@ -4051,7 +4168,19 @@
             </a:pPr>
             <a:r>
               <a:rPr lang="en-US" dirty="0" smtClean="0"/>
-              <a:t>1. whether their marketing campaign is success,</a:t>
+              <a:t>1</a:t>
+            </a:r>
+            <a:r>
+              <a:rPr lang="en-US" dirty="0" smtClean="0"/>
+              <a:t>. </a:t>
+            </a:r>
+            <a:r>
+              <a:rPr lang="en-US" dirty="0" smtClean="0"/>
+              <a:t>Whether </a:t>
+            </a:r>
+            <a:r>
+              <a:rPr lang="en-US" dirty="0" smtClean="0"/>
+              <a:t>their marketing campaign is success,</a:t>
             </a:r>
           </a:p>
           <a:p>
@@ -4060,7 +4189,15 @@
             </a:pPr>
             <a:r>
               <a:rPr lang="en-US" dirty="0" smtClean="0"/>
-              <a:t>2. what other methods or changes they can do to improve in the campaign</a:t>
+              <a:t>2. </a:t>
+            </a:r>
+            <a:r>
+              <a:rPr lang="en-US" dirty="0" smtClean="0"/>
+              <a:t>What are changes </a:t>
+            </a:r>
+            <a:r>
+              <a:rPr lang="en-US" dirty="0" smtClean="0"/>
+              <a:t>they can do to improve in the campaign</a:t>
             </a:r>
           </a:p>
           <a:p>
@@ -4157,7 +4294,7 @@
         <p:spPr/>
         <p:txBody>
           <a:bodyPr>
-            <a:normAutofit fontScale="92500"/>
+            <a:normAutofit fontScale="92500" lnSpcReduction="10000"/>
           </a:bodyPr>
           <a:lstStyle/>
           <a:p>
@@ -4202,8 +4339,21 @@
             </a:pPr>
             <a:r>
               <a:rPr lang="en-US" dirty="0" smtClean="0"/>
-              <a:t>We going to take two set of data's. </a:t>
-            </a:r>
+              <a:t>We </a:t>
+            </a:r>
+            <a:r>
+              <a:rPr lang="en-US" dirty="0" smtClean="0"/>
+              <a:t>are conducting our experiment with two sets </a:t>
+            </a:r>
+            <a:r>
+              <a:rPr lang="en-US" dirty="0" smtClean="0"/>
+              <a:t>of </a:t>
+            </a:r>
+            <a:r>
+              <a:rPr lang="en-US" dirty="0" smtClean="0"/>
+              <a:t>data. </a:t>
+            </a:r>
+            <a:endParaRPr lang="en-US" dirty="0" smtClean="0"/>
           </a:p>
           <a:p>
             <a:pPr marL="0" indent="0">
@@ -4211,8 +4361,21 @@
             </a:pPr>
             <a:r>
               <a:rPr lang="en-US" dirty="0" smtClean="0"/>
-              <a:t>1. 70-30 train and test split for which attributes are selected using feature selection</a:t>
-            </a:r>
+              <a:t>1. 70-30 train and test split </a:t>
+            </a:r>
+            <a:r>
+              <a:rPr lang="en-US" dirty="0" smtClean="0"/>
+              <a:t>with attributes selected </a:t>
+            </a:r>
+            <a:r>
+              <a:rPr lang="en-US" dirty="0" smtClean="0"/>
+              <a:t>using feature </a:t>
+            </a:r>
+            <a:r>
+              <a:rPr lang="en-US" dirty="0" smtClean="0"/>
+              <a:t>selection RFE.</a:t>
+            </a:r>
+            <a:endParaRPr lang="en-US" dirty="0" smtClean="0"/>
           </a:p>
           <a:p>
             <a:pPr marL="0" indent="0">
@@ -4286,9 +4449,18 @@
           <a:bodyPr/>
           <a:lstStyle/>
           <a:p>
-            <a:r>
-              <a:rPr lang="en-US" dirty="0" smtClean="0"/>
-              <a:t>Recall scores for different models</a:t>
+            <a:pPr algn="l"/>
+            <a:r>
+              <a:rPr lang="en-US" dirty="0"/>
+              <a:t>Classification </a:t>
+            </a:r>
+            <a:r>
+              <a:rPr lang="en-US" dirty="0" smtClean="0"/>
+              <a:t>models - </a:t>
+            </a:r>
+            <a:r>
+              <a:rPr lang="en-US" dirty="0" err="1" smtClean="0"/>
+              <a:t>Contd</a:t>
             </a:r>
             <a:endParaRPr lang="en-US" dirty="0"/>
           </a:p>
@@ -4306,62 +4478,37 @@
         </p:nvSpPr>
         <p:spPr/>
         <p:txBody>
-          <a:bodyPr/>
+          <a:bodyPr>
+            <a:normAutofit/>
+          </a:bodyPr>
           <a:lstStyle/>
           <a:p>
             <a:r>
               <a:rPr lang="en-US" dirty="0"/>
-              <a:t>Recall score for logistic regression classifier </a:t>
-            </a:r>
-            <a:r>
-              <a:rPr lang="en-US" dirty="0" smtClean="0"/>
-              <a:t>- 0.35</a:t>
-            </a:r>
-            <a:endParaRPr lang="en-US" dirty="0"/>
-          </a:p>
-          <a:p>
+              <a:t>For predicting if a client will subscribe to term </a:t>
+            </a:r>
+            <a:r>
+              <a:rPr lang="en-US" dirty="0" smtClean="0"/>
+              <a:t>deposit, important matrix to consider is </a:t>
+            </a:r>
+            <a:r>
+              <a:rPr lang="en-US" dirty="0" err="1"/>
+              <a:t>tp</a:t>
+            </a:r>
             <a:r>
               <a:rPr lang="en-US" dirty="0"/>
-              <a:t>Recall score for Decision Tree </a:t>
-            </a:r>
-            <a:r>
-              <a:rPr lang="en-US" dirty="0" smtClean="0"/>
-              <a:t>- 0.47 </a:t>
-            </a:r>
-            <a:endParaRPr lang="en-US" dirty="0"/>
-          </a:p>
-          <a:p>
+              <a:t> and </a:t>
+            </a:r>
+            <a:r>
+              <a:rPr lang="en-US" dirty="0" err="1"/>
+              <a:t>fn</a:t>
+            </a:r>
             <a:r>
               <a:rPr lang="en-US" dirty="0"/>
-              <a:t>Recall score for </a:t>
-            </a:r>
-            <a:r>
-              <a:rPr lang="en-US" dirty="0" smtClean="0"/>
-              <a:t>SVM - </a:t>
-            </a:r>
-            <a:r>
-              <a:rPr lang="en-US" dirty="0"/>
-              <a:t>0.00</a:t>
-            </a:r>
-          </a:p>
-          <a:p>
-            <a:r>
-              <a:rPr lang="en-US" dirty="0"/>
-              <a:t>Recall score for Random </a:t>
-            </a:r>
-            <a:r>
-              <a:rPr lang="en-US" dirty="0" smtClean="0"/>
-              <a:t>forest - </a:t>
-            </a:r>
-            <a:r>
-              <a:rPr lang="en-US" dirty="0"/>
-              <a:t>0.25</a:t>
-            </a:r>
-          </a:p>
-          <a:p>
-            <a:pPr marL="0" indent="0">
-              <a:buNone/>
-            </a:pPr>
+              <a:t> to calculate the campaign success thus we will be evaluating our models using recall score.(The recall is intuitively the ability of the classifier to find all the positive samples) </a:t>
+            </a:r>
+          </a:p>
+          <a:p>
             <a:endParaRPr lang="en-US" dirty="0"/>
           </a:p>
         </p:txBody>
@@ -4369,20 +4516,13 @@
     </p:spTree>
     <p:extLst>
       <p:ext uri="{BB962C8B-B14F-4D97-AF65-F5344CB8AC3E}">
-        <p14:creationId xmlns:p14="http://schemas.microsoft.com/office/powerpoint/2010/main" val="2948355882"/>
+        <p14:creationId xmlns:p14="http://schemas.microsoft.com/office/powerpoint/2010/main" val="2293112725"/>
       </p:ext>
     </p:extLst>
   </p:cSld>
   <p:clrMapOvr>
     <a:masterClrMapping/>
   </p:clrMapOvr>
-  <p:timing>
-    <p:tnLst>
-      <p:par>
-        <p:cTn xmlns:p14="http://schemas.microsoft.com/office/powerpoint/2010/main" id="1" dur="indefinite" restart="never" nodeType="tmRoot"/>
-      </p:par>
-    </p:tnLst>
-  </p:timing>
 </p:sld>
 </file>
 
@@ -4420,7 +4560,7 @@
           <a:p>
             <a:r>
               <a:rPr lang="en-US" dirty="0" smtClean="0"/>
-              <a:t>Confusion Matrix</a:t>
+              <a:t>Recall scores for different models</a:t>
             </a:r>
             <a:endParaRPr lang="en-US" dirty="0"/>
           </a:p>
@@ -4436,192 +4576,73 @@
             <p:ph idx="1"/>
           </p:nvPr>
         </p:nvSpPr>
-        <p:spPr>
-          <a:xfrm>
-            <a:off x="457200" y="1274920"/>
-            <a:ext cx="8229600" cy="4525963"/>
-          </a:xfrm>
-        </p:spPr>
-        <p:txBody>
-          <a:bodyPr>
-            <a:normAutofit fontScale="70000" lnSpcReduction="20000"/>
-          </a:bodyPr>
-          <a:lstStyle/>
-          <a:p>
-            <a:pPr marL="400050" lvl="1" indent="0">
+        <p:spPr/>
+        <p:txBody>
+          <a:bodyPr/>
+          <a:lstStyle/>
+          <a:p>
+            <a:r>
+              <a:rPr lang="en-US" dirty="0"/>
+              <a:t>Recall score for logistic regression classifier </a:t>
+            </a:r>
+            <a:r>
+              <a:rPr lang="en-US" dirty="0" smtClean="0"/>
+              <a:t>- </a:t>
+            </a:r>
+            <a:r>
+              <a:rPr lang="en-US" dirty="0" smtClean="0"/>
+              <a:t>0.33</a:t>
+            </a:r>
+            <a:endParaRPr lang="en-US" dirty="0"/>
+          </a:p>
+          <a:p>
+            <a:r>
+              <a:rPr lang="en-US" dirty="0"/>
+              <a:t>Recall score for Decision Tree </a:t>
+            </a:r>
+            <a:r>
+              <a:rPr lang="en-US" dirty="0" smtClean="0"/>
+              <a:t>- </a:t>
+            </a:r>
+            <a:r>
+              <a:rPr lang="en-US" dirty="0" smtClean="0"/>
+              <a:t>0.48</a:t>
+            </a:r>
+            <a:endParaRPr lang="en-US" dirty="0"/>
+          </a:p>
+          <a:p>
+            <a:r>
+              <a:rPr lang="en-US" dirty="0"/>
+              <a:t>Recall score for </a:t>
+            </a:r>
+            <a:r>
+              <a:rPr lang="en-US" dirty="0" smtClean="0"/>
+              <a:t>SVM - </a:t>
+            </a:r>
+            <a:r>
+              <a:rPr lang="en-US" dirty="0"/>
+              <a:t>0.00</a:t>
+            </a:r>
+          </a:p>
+          <a:p>
+            <a:r>
+              <a:rPr lang="en-US" dirty="0"/>
+              <a:t>Recall score for Random </a:t>
+            </a:r>
+            <a:r>
+              <a:rPr lang="en-US" dirty="0" smtClean="0"/>
+              <a:t>forest </a:t>
+            </a:r>
+            <a:r>
+              <a:rPr lang="en-US" dirty="0" smtClean="0"/>
+              <a:t>– 0.39</a:t>
+            </a:r>
+            <a:endParaRPr lang="en-US" dirty="0"/>
+          </a:p>
+          <a:p>
+            <a:pPr marL="0" indent="0">
               <a:buNone/>
             </a:pPr>
-            <a:r>
-              <a:rPr lang="en-US" dirty="0"/>
-              <a:t>TP FN</a:t>
-            </a:r>
-          </a:p>
-          <a:p>
-            <a:pPr marL="400050" lvl="1" indent="0">
-              <a:buNone/>
-            </a:pPr>
-            <a:r>
-              <a:rPr lang="de-DE" dirty="0" smtClean="0"/>
-              <a:t>FP </a:t>
-            </a:r>
-            <a:r>
-              <a:rPr lang="de-DE" dirty="0"/>
-              <a:t>TN </a:t>
-            </a:r>
-          </a:p>
-          <a:p>
-            <a:pPr marL="400050" lvl="1" indent="0">
-              <a:buNone/>
-            </a:pPr>
-            <a:r>
-              <a:rPr lang="de-DE" b="1" dirty="0" err="1" smtClean="0"/>
-              <a:t>Logistic</a:t>
-            </a:r>
-            <a:r>
-              <a:rPr lang="de-DE" b="1" dirty="0" smtClean="0"/>
-              <a:t> </a:t>
-            </a:r>
-            <a:r>
-              <a:rPr lang="de-DE" b="1" dirty="0" err="1" smtClean="0"/>
-              <a:t>regression</a:t>
-            </a:r>
-            <a:r>
-              <a:rPr lang="de-DE" b="1" dirty="0" smtClean="0"/>
-              <a:t>: </a:t>
-            </a:r>
-            <a:endParaRPr lang="de-DE" b="1" dirty="0"/>
-          </a:p>
-          <a:p>
-            <a:pPr marL="400050" lvl="1" indent="0">
-              <a:buNone/>
-            </a:pPr>
-            <a:r>
-              <a:rPr lang="en-US" dirty="0"/>
-              <a:t> [[7751  229]</a:t>
-            </a:r>
-          </a:p>
-          <a:p>
-            <a:pPr marL="400050" lvl="1" indent="0">
-              <a:buNone/>
-            </a:pPr>
-            <a:r>
-              <a:rPr lang="pt-BR" dirty="0"/>
-              <a:t> [ 691  372]]</a:t>
-            </a:r>
-          </a:p>
-          <a:p>
-            <a:pPr marL="400050" lvl="1" indent="0">
-              <a:buNone/>
-            </a:pPr>
-            <a:r>
-              <a:rPr lang="pt-BR" b="1" dirty="0" err="1" smtClean="0"/>
-              <a:t>Decision</a:t>
-            </a:r>
-            <a:r>
-              <a:rPr lang="pt-BR" b="1" dirty="0" smtClean="0"/>
-              <a:t> </a:t>
-            </a:r>
-            <a:r>
-              <a:rPr lang="pt-BR" b="1" dirty="0" err="1"/>
-              <a:t>Tree</a:t>
-            </a:r>
-            <a:r>
-              <a:rPr lang="pt-BR" b="1" dirty="0"/>
-              <a:t> </a:t>
-            </a:r>
-            <a:r>
-              <a:rPr lang="pt-BR" b="1" dirty="0" smtClean="0"/>
-              <a:t>:</a:t>
-            </a:r>
-            <a:endParaRPr lang="pt-BR" b="1" dirty="0"/>
-          </a:p>
-          <a:p>
-            <a:pPr marL="400050" lvl="1" indent="0">
-              <a:buNone/>
-            </a:pPr>
-            <a:r>
-              <a:rPr lang="en-US" dirty="0"/>
-              <a:t> [[7371  645]</a:t>
-            </a:r>
-          </a:p>
-          <a:p>
-            <a:pPr marL="400050" lvl="1" indent="0">
-              <a:buNone/>
-            </a:pPr>
-            <a:r>
-              <a:rPr lang="de-DE" dirty="0"/>
-              <a:t> [ 542  485]]</a:t>
-            </a:r>
-          </a:p>
-          <a:p>
-            <a:pPr marL="400050" lvl="1" indent="0">
-              <a:buNone/>
-            </a:pPr>
-            <a:r>
-              <a:rPr lang="de-DE" b="1" dirty="0" smtClean="0"/>
-              <a:t>SVM:</a:t>
-            </a:r>
-            <a:endParaRPr lang="de-DE" b="1" dirty="0"/>
-          </a:p>
-          <a:p>
-            <a:pPr marL="400050" lvl="1" indent="0">
-              <a:buNone/>
-            </a:pPr>
-            <a:r>
-              <a:rPr lang="de-DE" dirty="0"/>
-              <a:t> [[7984    0]</a:t>
-            </a:r>
-          </a:p>
-          <a:p>
-            <a:pPr marL="400050" lvl="1" indent="0">
-              <a:buNone/>
-            </a:pPr>
-            <a:r>
-              <a:rPr lang="pt-BR" dirty="0"/>
-              <a:t> [1057    2]]</a:t>
-            </a:r>
-          </a:p>
-          <a:p>
-            <a:pPr marL="400050" lvl="1" indent="0">
-              <a:buNone/>
-            </a:pPr>
-            <a:r>
-              <a:rPr lang="pt-BR" b="1" dirty="0" err="1" smtClean="0"/>
-              <a:t>Random</a:t>
-            </a:r>
-            <a:r>
-              <a:rPr lang="pt-BR" b="1" dirty="0" smtClean="0"/>
-              <a:t> </a:t>
-            </a:r>
-            <a:r>
-              <a:rPr lang="pt-BR" b="1" dirty="0" err="1" smtClean="0"/>
-              <a:t>forest</a:t>
-            </a:r>
-            <a:r>
-              <a:rPr lang="pt-BR" b="1" dirty="0" smtClean="0"/>
-              <a:t>: </a:t>
-            </a:r>
-            <a:endParaRPr lang="pt-BR" b="1" dirty="0"/>
-          </a:p>
-          <a:p>
-            <a:pPr marL="400050" lvl="1" indent="0">
-              <a:buNone/>
-            </a:pPr>
-            <a:r>
-              <a:rPr lang="pt-BR" dirty="0"/>
-              <a:t>  [[7902  103]</a:t>
-            </a:r>
-          </a:p>
-          <a:p>
-            <a:pPr marL="400050" lvl="1" indent="0">
-              <a:buNone/>
-            </a:pPr>
-            <a:r>
-              <a:rPr lang="pt-BR" dirty="0"/>
-              <a:t> [ 778  260]]</a:t>
-            </a:r>
-          </a:p>
-          <a:p>
             <a:endParaRPr lang="en-US" dirty="0"/>
           </a:p>
         </p:txBody>
@@ -4629,7 +4650,7 @@
     </p:spTree>
     <p:extLst>
       <p:ext uri="{BB962C8B-B14F-4D97-AF65-F5344CB8AC3E}">
-        <p14:creationId xmlns:p14="http://schemas.microsoft.com/office/powerpoint/2010/main" val="2541085740"/>
+        <p14:creationId xmlns:p14="http://schemas.microsoft.com/office/powerpoint/2010/main" val="2948355882"/>
       </p:ext>
     </p:extLst>
   </p:cSld>
@@ -4678,10 +4699,9 @@
           <a:bodyPr/>
           <a:lstStyle/>
           <a:p>
-            <a:pPr algn="l"/>
-            <a:r>
-              <a:rPr lang="en-US" dirty="0" smtClean="0"/>
-              <a:t>Results:</a:t>
+            <a:r>
+              <a:rPr lang="en-US" dirty="0" smtClean="0"/>
+              <a:t>Confusion Matrix</a:t>
             </a:r>
             <a:endParaRPr lang="en-US" dirty="0"/>
           </a:p>
@@ -4697,29 +4717,157 @@
             <p:ph idx="1"/>
           </p:nvPr>
         </p:nvSpPr>
-        <p:spPr/>
+        <p:spPr>
+          <a:xfrm>
+            <a:off x="457200" y="1274920"/>
+            <a:ext cx="8229600" cy="4525963"/>
+          </a:xfrm>
+        </p:spPr>
         <p:txBody>
           <a:bodyPr>
-            <a:normAutofit/>
+            <a:normAutofit fontScale="62500" lnSpcReduction="20000"/>
           </a:bodyPr>
           <a:lstStyle/>
           <a:p>
             <a:r>
-              <a:rPr lang="en-US" dirty="0" smtClean="0"/>
-              <a:t>1. Decision tree have the largest number of FN and TN, and high recall score.</a:t>
-            </a:r>
-          </a:p>
-          <a:p>
-            <a:r>
-              <a:rPr lang="en-US" dirty="0" smtClean="0"/>
-              <a:t>2. SVM has low number of FN and TN -  not a ideal model for our problem</a:t>
-            </a:r>
-          </a:p>
-          <a:p>
-            <a:r>
-              <a:rPr lang="en-US" dirty="0" smtClean="0"/>
-              <a:t>3. Logistic Regression and Random forest seems to have lower recall score and lower number of false negatives. </a:t>
-            </a:r>
+              <a:rPr lang="en-US" dirty="0"/>
+              <a:t>Confusion matrix with 80-20 </a:t>
+            </a:r>
+            <a:r>
+              <a:rPr lang="en-US" dirty="0" smtClean="0"/>
+              <a:t> train and test data</a:t>
+            </a:r>
+            <a:endParaRPr lang="en-US" dirty="0"/>
+          </a:p>
+          <a:p>
+            <a:pPr lvl="1"/>
+            <a:r>
+              <a:rPr lang="en-US" dirty="0"/>
+              <a:t> TN </a:t>
+            </a:r>
+            <a:r>
+              <a:rPr lang="en-US" dirty="0" smtClean="0"/>
+              <a:t>FP</a:t>
+            </a:r>
+            <a:endParaRPr lang="en-US" dirty="0"/>
+          </a:p>
+          <a:p>
+            <a:pPr lvl="1"/>
+            <a:r>
+              <a:rPr lang="fr-FR" dirty="0"/>
+              <a:t> FN TP </a:t>
+            </a:r>
+          </a:p>
+          <a:p>
+            <a:r>
+              <a:rPr lang="fr-FR" dirty="0" smtClean="0"/>
+              <a:t> </a:t>
+            </a:r>
+            <a:r>
+              <a:rPr lang="fr-FR" dirty="0" err="1"/>
+              <a:t>Logistic</a:t>
+            </a:r>
+            <a:r>
+              <a:rPr lang="fr-FR" dirty="0"/>
+              <a:t> </a:t>
+            </a:r>
+            <a:r>
+              <a:rPr lang="fr-FR" dirty="0" err="1"/>
+              <a:t>regression</a:t>
+            </a:r>
+            <a:r>
+              <a:rPr lang="fr-FR" dirty="0"/>
+              <a:t> </a:t>
+            </a:r>
+          </a:p>
+          <a:p>
+            <a:pPr lvl="1"/>
+            <a:r>
+              <a:rPr lang="is-IS" dirty="0"/>
+              <a:t> [[7738  210]</a:t>
+            </a:r>
+          </a:p>
+          <a:p>
+            <a:pPr lvl="1"/>
+            <a:r>
+              <a:rPr lang="en-US" dirty="0"/>
+              <a:t> [ 735  360]]</a:t>
+            </a:r>
+          </a:p>
+          <a:p>
+            <a:r>
+              <a:rPr lang="en-US" dirty="0" smtClean="0"/>
+              <a:t>Decision </a:t>
+            </a:r>
+            <a:r>
+              <a:rPr lang="en-US" dirty="0"/>
+              <a:t>Tree </a:t>
+            </a:r>
+          </a:p>
+          <a:p>
+            <a:pPr lvl="1"/>
+            <a:r>
+              <a:rPr lang="de-DE" dirty="0"/>
+              <a:t> [[7414  571]</a:t>
+            </a:r>
+          </a:p>
+          <a:p>
+            <a:pPr lvl="1"/>
+            <a:r>
+              <a:rPr lang="pt-BR" dirty="0"/>
+              <a:t> [ 545  513]]</a:t>
+            </a:r>
+          </a:p>
+          <a:p>
+            <a:r>
+              <a:rPr lang="pt-BR" dirty="0" smtClean="0"/>
+              <a:t>SVM </a:t>
+            </a:r>
+            <a:endParaRPr lang="pt-BR" dirty="0"/>
+          </a:p>
+          <a:p>
+            <a:pPr lvl="1"/>
+            <a:r>
+              <a:rPr lang="de-DE" dirty="0"/>
+              <a:t> [[7968    0]</a:t>
+            </a:r>
+          </a:p>
+          <a:p>
+            <a:pPr lvl="1"/>
+            <a:r>
+              <a:rPr lang="de-DE" dirty="0"/>
+              <a:t> [1075    0]]</a:t>
+            </a:r>
+          </a:p>
+          <a:p>
+            <a:r>
+              <a:rPr lang="de-DE" dirty="0" smtClean="0"/>
+              <a:t>Random </a:t>
+            </a:r>
+            <a:r>
+              <a:rPr lang="de-DE" dirty="0" err="1"/>
+              <a:t>forest</a:t>
+            </a:r>
+            <a:r>
+              <a:rPr lang="de-DE" dirty="0"/>
+              <a:t> </a:t>
+            </a:r>
+          </a:p>
+          <a:p>
+            <a:pPr lvl="1"/>
+            <a:r>
+              <a:rPr lang="pt-BR" dirty="0"/>
+              <a:t>  [[7680  257]</a:t>
+            </a:r>
+          </a:p>
+          <a:p>
+            <a:pPr lvl="1"/>
+            <a:r>
+              <a:rPr lang="de-DE" dirty="0"/>
+              <a:t> [ 678  428]]</a:t>
+            </a:r>
+          </a:p>
+          <a:p>
             <a:endParaRPr lang="en-US" dirty="0"/>
           </a:p>
         </p:txBody>
@@ -4727,7 +4875,7 @@
     </p:spTree>
     <p:extLst>
       <p:ext uri="{BB962C8B-B14F-4D97-AF65-F5344CB8AC3E}">
-        <p14:creationId xmlns:p14="http://schemas.microsoft.com/office/powerpoint/2010/main" val="2876225163"/>
+        <p14:creationId xmlns:p14="http://schemas.microsoft.com/office/powerpoint/2010/main" val="2541085740"/>
       </p:ext>
     </p:extLst>
   </p:cSld>
@@ -4763,6 +4911,30 @@
       </p:grpSpPr>
       <p:sp>
         <p:nvSpPr>
+          <p:cNvPr id="2" name="Title 1"/>
+          <p:cNvSpPr>
+            <a:spLocks noGrp="1"/>
+          </p:cNvSpPr>
+          <p:nvPr>
+            <p:ph type="title"/>
+          </p:nvPr>
+        </p:nvSpPr>
+        <p:spPr/>
+        <p:txBody>
+          <a:bodyPr/>
+          <a:lstStyle/>
+          <a:p>
+            <a:pPr algn="l"/>
+            <a:r>
+              <a:rPr lang="en-US" dirty="0" smtClean="0"/>
+              <a:t>Results:</a:t>
+            </a:r>
+            <a:endParaRPr lang="en-US" dirty="0"/>
+          </a:p>
+        </p:txBody>
+      </p:sp>
+      <p:sp>
+        <p:nvSpPr>
           <p:cNvPr id="3" name="Content Placeholder 2"/>
           <p:cNvSpPr>
             <a:spLocks noGrp="1"/>
@@ -4773,13 +4945,72 @@
         </p:nvSpPr>
         <p:spPr/>
         <p:txBody>
-          <a:bodyPr/>
-          <a:lstStyle/>
-          <a:p>
-            <a:r>
-              <a:rPr lang="en-US" dirty="0" smtClean="0"/>
-              <a:t>Random forest seems to be better suited to predict if the clients will subscribe to term deposit or not.</a:t>
-            </a:r>
+          <a:bodyPr>
+            <a:normAutofit fontScale="77500" lnSpcReduction="20000"/>
+          </a:bodyPr>
+          <a:lstStyle/>
+          <a:p>
+            <a:r>
+              <a:rPr lang="en-US" dirty="0"/>
+              <a:t>From the </a:t>
+            </a:r>
+            <a:r>
+              <a:rPr lang="en-US" dirty="0" smtClean="0"/>
+              <a:t>confusion </a:t>
+            </a:r>
+            <a:r>
+              <a:rPr lang="en-US" dirty="0"/>
+              <a:t>matrix, Decision tree </a:t>
+            </a:r>
+            <a:r>
+              <a:rPr lang="en-US" dirty="0" smtClean="0"/>
+              <a:t>has the  </a:t>
+            </a:r>
+            <a:r>
+              <a:rPr lang="en-US" dirty="0"/>
+              <a:t>highest recall </a:t>
+            </a:r>
+            <a:r>
+              <a:rPr lang="en-US" dirty="0" smtClean="0"/>
+              <a:t>score</a:t>
+            </a:r>
+            <a:endParaRPr lang="en-US" dirty="0"/>
+          </a:p>
+          <a:p>
+            <a:pPr marL="0" indent="0">
+              <a:buNone/>
+            </a:pPr>
+            <a:endParaRPr lang="en-US" dirty="0"/>
+          </a:p>
+          <a:p>
+            <a:r>
+              <a:rPr lang="en-US" dirty="0"/>
+              <a:t>SVM has low number of FP and TP, and categorizing all the values as negatives so we cant use SVM for our prediction. </a:t>
+            </a:r>
+          </a:p>
+          <a:p>
+            <a:endParaRPr lang="en-US" dirty="0"/>
+          </a:p>
+          <a:p>
+            <a:r>
+              <a:rPr lang="en-US" dirty="0"/>
+              <a:t>Logistic Regression and Random forest seems to have similar recall score and lower number of positives.</a:t>
+            </a:r>
+          </a:p>
+          <a:p>
+            <a:endParaRPr lang="en-US" dirty="0"/>
+          </a:p>
+          <a:p>
+            <a:r>
+              <a:rPr lang="en-US" dirty="0" smtClean="0"/>
+              <a:t>From our analysis we can </a:t>
+            </a:r>
+            <a:r>
+              <a:rPr lang="en-US" dirty="0"/>
+              <a:t>conclude that Decision Tree model is better suited for our prediction.</a:t>
+            </a:r>
+          </a:p>
+          <a:p>
             <a:endParaRPr lang="en-US" dirty="0"/>
           </a:p>
         </p:txBody>
@@ -4787,7 +5018,7 @@
     </p:spTree>
     <p:extLst>
       <p:ext uri="{BB962C8B-B14F-4D97-AF65-F5344CB8AC3E}">
-        <p14:creationId xmlns:p14="http://schemas.microsoft.com/office/powerpoint/2010/main" val="3629960206"/>
+        <p14:creationId xmlns:p14="http://schemas.microsoft.com/office/powerpoint/2010/main" val="2876225163"/>
       </p:ext>
     </p:extLst>
   </p:cSld>

</xml_diff>